<commit_message>
add lecture2 PPT publisher
</commit_message>
<xml_diff>
--- a/PPT/2차시.pptx
+++ b/PPT/2차시.pptx
@@ -221,7 +221,7 @@
           <a:p>
             <a:fld id="{B8039FB8-6F18-436D-9454-D1944E32D5DF}" type="datetimeFigureOut">
               <a:rPr lang="ko-KR" altLang="en-US" smtClean="0"/>
-              <a:t>2017-11-25</a:t>
+              <a:t>2017-12-02</a:t>
             </a:fld>
             <a:endParaRPr lang="ko-KR" altLang="en-US"/>
           </a:p>
@@ -10382,6 +10382,26 @@
           <a:bodyPr/>
           <a:lstStyle/>
           <a:p>
+            <a:r>
+              <a:rPr lang="ko-KR" altLang="en-US" dirty="0" smtClean="0"/>
+              <a:t>문진호</a:t>
+            </a:r>
+            <a:r>
+              <a:rPr lang="en-US" altLang="ko-KR" dirty="0" smtClean="0"/>
+              <a:t>, </a:t>
+            </a:r>
+            <a:r>
+              <a:rPr lang="ko-KR" altLang="en-US" dirty="0" err="1" smtClean="0"/>
+              <a:t>임재민</a:t>
+            </a:r>
+            <a:r>
+              <a:rPr lang="en-US" altLang="ko-KR" dirty="0" smtClean="0"/>
+              <a:t>, </a:t>
+            </a:r>
+            <a:r>
+              <a:rPr lang="ko-KR" altLang="en-US" dirty="0" err="1" smtClean="0"/>
+              <a:t>연준모</a:t>
+            </a:r>
             <a:endParaRPr lang="ko-KR" altLang="en-US" dirty="0"/>
           </a:p>
         </p:txBody>

</xml_diff>

<commit_message>
beautify 2, 4, 6 lectPPT
</commit_message>
<xml_diff>
--- a/PPT/2차시.pptx
+++ b/PPT/2차시.pptx
@@ -221,7 +221,7 @@
           <a:p>
             <a:fld id="{B8039FB8-6F18-436D-9454-D1944E32D5DF}" type="datetimeFigureOut">
               <a:rPr lang="ko-KR" altLang="en-US" smtClean="0"/>
-              <a:t>2017-12-02</a:t>
+              <a:t>2017-12-25</a:t>
             </a:fld>
             <a:endParaRPr lang="ko-KR" altLang="en-US"/>
           </a:p>
@@ -1588,7 +1588,10 @@
           </a:bodyPr>
           <a:lstStyle>
             <a:lvl1pPr algn="ctr">
-              <a:defRPr sz="11500"/>
+              <a:defRPr sz="11500">
+                <a:latin typeface="나눔스퀘어 ExtraBold" panose="020B0600000101010101" pitchFamily="50" charset="-127"/>
+                <a:ea typeface="나눔스퀘어 ExtraBold" panose="020B0600000101010101" pitchFamily="50" charset="-127"/>
+              </a:defRPr>
             </a:lvl1pPr>
           </a:lstStyle>
           <a:p>
@@ -1728,7 +1731,8 @@
             <a:lvl1pPr marL="0" indent="0" algn="ctr">
               <a:buNone/>
               <a:defRPr sz="1800">
-                <a:latin typeface="+mn-lt"/>
+                <a:latin typeface="나눔스퀘어" panose="020B0600000101010101" pitchFamily="50" charset="-127"/>
+                <a:ea typeface="나눔스퀘어" panose="020B0600000101010101" pitchFamily="50" charset="-127"/>
               </a:defRPr>
             </a:lvl1pPr>
           </a:lstStyle>
@@ -2246,7 +2250,8 @@
                     <a:lumOff val="25000"/>
                   </a:schemeClr>
                 </a:solidFill>
-                <a:latin typeface="+mn-lt"/>
+                <a:latin typeface="나눔스퀘어 ExtraBold" panose="020B0600000101010101" pitchFamily="50" charset="-127"/>
+                <a:ea typeface="나눔스퀘어 ExtraBold" panose="020B0600000101010101" pitchFamily="50" charset="-127"/>
               </a:defRPr>
             </a:lvl1pPr>
           </a:lstStyle>
@@ -2293,7 +2298,38 @@
         </p:spPr>
         <p:txBody>
           <a:bodyPr/>
-          <a:lstStyle/>
+          <a:lstStyle>
+            <a:lvl1pPr>
+              <a:defRPr>
+                <a:latin typeface="나눔스퀘어" panose="020B0600000101010101" pitchFamily="50" charset="-127"/>
+                <a:ea typeface="나눔스퀘어" panose="020B0600000101010101" pitchFamily="50" charset="-127"/>
+              </a:defRPr>
+            </a:lvl1pPr>
+            <a:lvl2pPr>
+              <a:defRPr>
+                <a:latin typeface="나눔스퀘어" panose="020B0600000101010101" pitchFamily="50" charset="-127"/>
+                <a:ea typeface="나눔스퀘어" panose="020B0600000101010101" pitchFamily="50" charset="-127"/>
+              </a:defRPr>
+            </a:lvl2pPr>
+            <a:lvl3pPr>
+              <a:defRPr>
+                <a:latin typeface="나눔스퀘어" panose="020B0600000101010101" pitchFamily="50" charset="-127"/>
+                <a:ea typeface="나눔스퀘어" panose="020B0600000101010101" pitchFamily="50" charset="-127"/>
+              </a:defRPr>
+            </a:lvl3pPr>
+            <a:lvl4pPr>
+              <a:defRPr>
+                <a:latin typeface="나눔스퀘어" panose="020B0600000101010101" pitchFamily="50" charset="-127"/>
+                <a:ea typeface="나눔스퀘어" panose="020B0600000101010101" pitchFamily="50" charset="-127"/>
+              </a:defRPr>
+            </a:lvl4pPr>
+            <a:lvl5pPr>
+              <a:defRPr>
+                <a:latin typeface="나눔스퀘어" panose="020B0600000101010101" pitchFamily="50" charset="-127"/>
+                <a:ea typeface="나눔스퀘어" panose="020B0600000101010101" pitchFamily="50" charset="-127"/>
+              </a:defRPr>
+            </a:lvl5pPr>
+          </a:lstStyle>
           <a:p>
             <a:pPr lvl="0"/>
             <a:r>
@@ -2613,7 +2649,8 @@
             <a:lvl1pPr marL="0" indent="0" algn="ctr">
               <a:buNone/>
               <a:defRPr sz="1800">
-                <a:latin typeface="+mn-lt"/>
+                <a:latin typeface="나눔스퀘어" panose="020B0600000101010101" pitchFamily="50" charset="-127"/>
+                <a:ea typeface="나눔스퀘어" panose="020B0600000101010101" pitchFamily="50" charset="-127"/>
               </a:defRPr>
             </a:lvl1pPr>
           </a:lstStyle>
@@ -2704,7 +2741,8 @@
                     <a:lumOff val="25000"/>
                   </a:schemeClr>
                 </a:solidFill>
-                <a:latin typeface="+mn-lt"/>
+                <a:latin typeface="나눔스퀘어 ExtraBold" panose="020B0600000101010101" pitchFamily="50" charset="-127"/>
+                <a:ea typeface="나눔스퀘어 ExtraBold" panose="020B0600000101010101" pitchFamily="50" charset="-127"/>
               </a:defRPr>
             </a:lvl1pPr>
           </a:lstStyle>
@@ -11565,18 +11603,30 @@
           <a:lstStyle/>
           <a:p>
             <a:r>
-              <a:rPr lang="en-US" altLang="ko-KR" dirty="0" smtClean="0"/>
+              <a:rPr lang="en-US" altLang="ko-KR" dirty="0" smtClean="0">
+                <a:latin typeface="나눔스퀘어" panose="020B0600000101010101" pitchFamily="50" charset="-127"/>
+                <a:ea typeface="나눔스퀘어" panose="020B0600000101010101" pitchFamily="50" charset="-127"/>
+              </a:rPr>
               <a:t>ABC</a:t>
             </a:r>
             <a:r>
-              <a:rPr lang="ko-KR" altLang="en-US" dirty="0" smtClean="0"/>
+              <a:rPr lang="ko-KR" altLang="en-US" dirty="0" smtClean="0">
+                <a:latin typeface="나눔스퀘어" panose="020B0600000101010101" pitchFamily="50" charset="-127"/>
+                <a:ea typeface="나눔스퀘어" panose="020B0600000101010101" pitchFamily="50" charset="-127"/>
+              </a:rPr>
               <a:t>를 화면에 출력시켜</a:t>
             </a:r>
             <a:r>
-              <a:rPr lang="en-US" altLang="ko-KR" dirty="0" smtClean="0"/>
+              <a:rPr lang="en-US" altLang="ko-KR" dirty="0" smtClean="0">
+                <a:latin typeface="나눔스퀘어" panose="020B0600000101010101" pitchFamily="50" charset="-127"/>
+                <a:ea typeface="나눔스퀘어" panose="020B0600000101010101" pitchFamily="50" charset="-127"/>
+              </a:rPr>
               <a:t>!</a:t>
             </a:r>
-            <a:endParaRPr lang="ko-KR" altLang="en-US" dirty="0"/>
+            <a:endParaRPr lang="ko-KR" altLang="en-US" dirty="0">
+              <a:latin typeface="나눔스퀘어" panose="020B0600000101010101" pitchFamily="50" charset="-127"/>
+              <a:ea typeface="나눔스퀘어" panose="020B0600000101010101" pitchFamily="50" charset="-127"/>
+            </a:endParaRPr>
           </a:p>
         </p:txBody>
       </p:sp>
@@ -11633,10 +11683,16 @@
           <a:lstStyle/>
           <a:p>
             <a:r>
-              <a:rPr lang="en-US" altLang="ko-KR" dirty="0" smtClean="0"/>
+              <a:rPr lang="en-US" altLang="ko-KR" dirty="0" smtClean="0">
+                <a:latin typeface="나눔스퀘어" panose="020B0600000101010101" pitchFamily="50" charset="-127"/>
+                <a:ea typeface="나눔스퀘어" panose="020B0600000101010101" pitchFamily="50" charset="-127"/>
+              </a:rPr>
               <a:t>??????</a:t>
             </a:r>
-            <a:endParaRPr lang="ko-KR" altLang="en-US" dirty="0"/>
+            <a:endParaRPr lang="ko-KR" altLang="en-US" dirty="0">
+              <a:latin typeface="나눔스퀘어" panose="020B0600000101010101" pitchFamily="50" charset="-127"/>
+              <a:ea typeface="나눔스퀘어" panose="020B0600000101010101" pitchFamily="50" charset="-127"/>
+            </a:endParaRPr>
           </a:p>
         </p:txBody>
       </p:sp>
@@ -11887,18 +11943,30 @@
           <a:lstStyle/>
           <a:p>
             <a:r>
-              <a:rPr lang="en-US" altLang="ko-KR" dirty="0" smtClean="0"/>
+              <a:rPr lang="en-US" altLang="ko-KR" dirty="0" smtClean="0">
+                <a:latin typeface="나눔스퀘어" panose="020B0600000101010101" pitchFamily="50" charset="-127"/>
+                <a:ea typeface="나눔스퀘어" panose="020B0600000101010101" pitchFamily="50" charset="-127"/>
+              </a:rPr>
               <a:t>ABC</a:t>
             </a:r>
             <a:r>
-              <a:rPr lang="ko-KR" altLang="en-US" dirty="0" smtClean="0"/>
+              <a:rPr lang="ko-KR" altLang="en-US" dirty="0" smtClean="0">
+                <a:latin typeface="나눔스퀘어" panose="020B0600000101010101" pitchFamily="50" charset="-127"/>
+                <a:ea typeface="나눔스퀘어" panose="020B0600000101010101" pitchFamily="50" charset="-127"/>
+              </a:rPr>
               <a:t>를 화면에 출력시켜</a:t>
             </a:r>
             <a:r>
-              <a:rPr lang="en-US" altLang="ko-KR" dirty="0" smtClean="0"/>
+              <a:rPr lang="en-US" altLang="ko-KR" dirty="0" smtClean="0">
+                <a:latin typeface="나눔스퀘어" panose="020B0600000101010101" pitchFamily="50" charset="-127"/>
+                <a:ea typeface="나눔스퀘어" panose="020B0600000101010101" pitchFamily="50" charset="-127"/>
+              </a:rPr>
               <a:t>!</a:t>
             </a:r>
-            <a:endParaRPr lang="ko-KR" altLang="en-US" dirty="0"/>
+            <a:endParaRPr lang="ko-KR" altLang="en-US" dirty="0">
+              <a:latin typeface="나눔스퀘어" panose="020B0600000101010101" pitchFamily="50" charset="-127"/>
+              <a:ea typeface="나눔스퀘어" panose="020B0600000101010101" pitchFamily="50" charset="-127"/>
+            </a:endParaRPr>
           </a:p>
         </p:txBody>
       </p:sp>
@@ -11955,14 +12023,23 @@
           <a:lstStyle/>
           <a:p>
             <a:r>
-              <a:rPr lang="ko-KR" altLang="en-US" dirty="0" smtClean="0"/>
+              <a:rPr lang="ko-KR" altLang="en-US" dirty="0" smtClean="0">
+                <a:latin typeface="나눔스퀘어" panose="020B0600000101010101" pitchFamily="50" charset="-127"/>
+                <a:ea typeface="나눔스퀘어" panose="020B0600000101010101" pitchFamily="50" charset="-127"/>
+              </a:rPr>
               <a:t>아하</a:t>
             </a:r>
             <a:r>
-              <a:rPr lang="en-US" altLang="ko-KR" dirty="0" smtClean="0"/>
+              <a:rPr lang="en-US" altLang="ko-KR" dirty="0" smtClean="0">
+                <a:latin typeface="나눔스퀘어" panose="020B0600000101010101" pitchFamily="50" charset="-127"/>
+                <a:ea typeface="나눔스퀘어" panose="020B0600000101010101" pitchFamily="50" charset="-127"/>
+              </a:rPr>
               <a:t>~</a:t>
             </a:r>
-            <a:endParaRPr lang="ko-KR" altLang="en-US" dirty="0"/>
+            <a:endParaRPr lang="ko-KR" altLang="en-US" dirty="0">
+              <a:latin typeface="나눔스퀘어" panose="020B0600000101010101" pitchFamily="50" charset="-127"/>
+              <a:ea typeface="나눔스퀘어" panose="020B0600000101010101" pitchFamily="50" charset="-127"/>
+            </a:endParaRPr>
           </a:p>
         </p:txBody>
       </p:sp>
@@ -12079,10 +12156,16 @@
           <a:lstStyle/>
           <a:p>
             <a:r>
-              <a:rPr lang="ko-KR" altLang="en-US" smtClean="0"/>
+              <a:rPr lang="ko-KR" altLang="en-US" dirty="0" smtClean="0">
+                <a:latin typeface="나눔스퀘어" panose="020B0600000101010101" pitchFamily="50" charset="-127"/>
+                <a:ea typeface="나눔스퀘어" panose="020B0600000101010101" pitchFamily="50" charset="-127"/>
+              </a:rPr>
               <a:t>컴파일러</a:t>
             </a:r>
-            <a:endParaRPr lang="ko-KR" altLang="en-US"/>
+            <a:endParaRPr lang="ko-KR" altLang="en-US" dirty="0">
+              <a:latin typeface="나눔스퀘어" panose="020B0600000101010101" pitchFamily="50" charset="-127"/>
+              <a:ea typeface="나눔스퀘어" panose="020B0600000101010101" pitchFamily="50" charset="-127"/>
+            </a:endParaRPr>
           </a:p>
         </p:txBody>
       </p:sp>

</xml_diff>